<commit_message>
update slides; fix rubocop;
</commit_message>
<xml_diff>
--- a/slides/Drygems_in_action.pptx
+++ b/slides/Drygems_in_action.pptx
@@ -3347,7 +3347,7 @@
         </p:nvSpPr>
         <p:spPr>
           <a:xfrm>
-            <a:off x="381000" y="685800"/>
+            <a:off x="381300" y="685800"/>
             <a:ext cx="6096000" cy="3429000"/>
           </a:xfrm>
           <a:custGeom>
@@ -14147,7 +14147,7 @@
               <a:buChar char="●"/>
             </a:pPr>
             <a:r>
-              <a:rPr lang="en" sz="2400" dirty="0">
+              <a:rPr lang="en" sz="2400">
                 <a:latin typeface="Roboto"/>
                 <a:ea typeface="Roboto"/>
                 <a:cs typeface="Roboto"/>
@@ -14155,7 +14155,7 @@
               </a:rPr>
               <a:t>leaner models </a:t>
             </a:r>
-            <a:endParaRPr sz="2400" dirty="0">
+            <a:endParaRPr sz="2400">
               <a:latin typeface="Roboto"/>
               <a:ea typeface="Roboto"/>
               <a:cs typeface="Roboto"/>
@@ -14178,7 +14178,7 @@
               <a:buChar char="●"/>
             </a:pPr>
             <a:r>
-              <a:rPr lang="en" sz="2400" dirty="0">
+              <a:rPr lang="en" sz="2400">
                 <a:latin typeface="Roboto"/>
                 <a:ea typeface="Roboto"/>
                 <a:cs typeface="Roboto"/>
@@ -14186,7 +14186,7 @@
               </a:rPr>
               <a:t>leaner controllers</a:t>
             </a:r>
-            <a:endParaRPr sz="2400" dirty="0">
+            <a:endParaRPr sz="2400">
               <a:latin typeface="Roboto"/>
               <a:ea typeface="Roboto"/>
               <a:cs typeface="Roboto"/>
@@ -14208,89 +14208,6 @@
               <a:buFont typeface="Roboto"/>
               <a:buChar char="●"/>
             </a:pPr>
-            <a:r>
-              <a:rPr lang="en" sz="2400" dirty="0">
-                <a:latin typeface="Roboto"/>
-                <a:ea typeface="Roboto"/>
-                <a:cs typeface="Roboto"/>
-                <a:sym typeface="Roboto"/>
-              </a:rPr>
-              <a:t>reusable services</a:t>
-            </a:r>
-          </a:p>
-          <a:p>
-            <a:pPr marL="457200" lvl="0" indent="-381000" algn="l" rtl="0">
-              <a:lnSpc>
-                <a:spcPct val="115000"/>
-              </a:lnSpc>
-              <a:spcBef>
-                <a:spcPts val="0"/>
-              </a:spcBef>
-              <a:spcAft>
-                <a:spcPts val="0"/>
-              </a:spcAft>
-              <a:buSzPts val="2400"/>
-              <a:buFont typeface="Roboto"/>
-              <a:buChar char="●"/>
-            </a:pPr>
-            <a:r>
-              <a:rPr lang="de-DE" sz="2400" dirty="0">
-                <a:latin typeface="Roboto"/>
-                <a:ea typeface="Roboto"/>
-                <a:cs typeface="Roboto"/>
-                <a:sym typeface="Roboto"/>
-              </a:rPr>
-              <a:t>E</a:t>
-            </a:r>
-            <a:r>
-              <a:rPr lang="en" sz="2400" dirty="0" err="1">
-                <a:latin typeface="Roboto"/>
-                <a:ea typeface="Roboto"/>
-                <a:cs typeface="Roboto"/>
-                <a:sym typeface="Roboto"/>
-              </a:rPr>
-              <a:t>asier</a:t>
-            </a:r>
-            <a:r>
-              <a:rPr lang="en" sz="2400" dirty="0">
-                <a:latin typeface="Roboto"/>
-                <a:ea typeface="Roboto"/>
-                <a:cs typeface="Roboto"/>
-                <a:sym typeface="Roboto"/>
-              </a:rPr>
-              <a:t> to test/debug/extend</a:t>
-            </a:r>
-            <a:endParaRPr sz="2400" dirty="0">
-              <a:latin typeface="Roboto"/>
-              <a:ea typeface="Roboto"/>
-              <a:cs typeface="Roboto"/>
-              <a:sym typeface="Roboto"/>
-            </a:endParaRPr>
-          </a:p>
-          <a:p>
-            <a:pPr marL="457200" lvl="0" indent="-381000" algn="l" rtl="0">
-              <a:lnSpc>
-                <a:spcPct val="115000"/>
-              </a:lnSpc>
-              <a:spcBef>
-                <a:spcPts val="0"/>
-              </a:spcBef>
-              <a:spcAft>
-                <a:spcPts val="0"/>
-              </a:spcAft>
-              <a:buSzPts val="2400"/>
-              <a:buFont typeface="Roboto"/>
-              <a:buChar char="●"/>
-            </a:pPr>
-            <a:r>
-              <a:rPr lang="en" sz="2400" dirty="0">
-                <a:latin typeface="Roboto"/>
-                <a:ea typeface="Roboto"/>
-                <a:cs typeface="Roboto"/>
-                <a:sym typeface="Roboto"/>
-              </a:rPr>
-              <a:t>building block </a:t>
-            </a:r>
             <a:r>
               <a:rPr lang="en" sz="2400">
                 <a:latin typeface="Roboto"/>
@@ -14298,9 +14215,91 @@
                 <a:cs typeface="Roboto"/>
                 <a:sym typeface="Roboto"/>
               </a:rPr>
-              <a:t>for domain-services</a:t>
-            </a:r>
-            <a:endParaRPr sz="2400" dirty="0">
+              <a:t>reusable services </a:t>
+            </a:r>
+            <a:endParaRPr sz="2400">
+              <a:latin typeface="Roboto"/>
+              <a:ea typeface="Roboto"/>
+              <a:cs typeface="Roboto"/>
+              <a:sym typeface="Roboto"/>
+            </a:endParaRPr>
+          </a:p>
+          <a:p>
+            <a:pPr marL="457200" lvl="0" indent="-381000" algn="l" rtl="0">
+              <a:lnSpc>
+                <a:spcPct val="115000"/>
+              </a:lnSpc>
+              <a:spcBef>
+                <a:spcPts val="0"/>
+              </a:spcBef>
+              <a:spcAft>
+                <a:spcPts val="0"/>
+              </a:spcAft>
+              <a:buSzPts val="2400"/>
+              <a:buFont typeface="Roboto"/>
+              <a:buChar char="●"/>
+            </a:pPr>
+            <a:r>
+              <a:rPr lang="en" sz="2400">
+                <a:latin typeface="Roboto"/>
+                <a:ea typeface="Roboto"/>
+                <a:cs typeface="Roboto"/>
+                <a:sym typeface="Roboto"/>
+              </a:rPr>
+              <a:t>SOLID architecture</a:t>
+            </a:r>
+            <a:endParaRPr sz="2400">
+              <a:latin typeface="Roboto"/>
+              <a:ea typeface="Roboto"/>
+              <a:cs typeface="Roboto"/>
+              <a:sym typeface="Roboto"/>
+            </a:endParaRPr>
+          </a:p>
+          <a:p>
+            <a:pPr marL="457200" lvl="0" indent="-381000" algn="l" rtl="0">
+              <a:lnSpc>
+                <a:spcPct val="115000"/>
+              </a:lnSpc>
+              <a:spcBef>
+                <a:spcPts val="0"/>
+              </a:spcBef>
+              <a:spcAft>
+                <a:spcPts val="0"/>
+              </a:spcAft>
+              <a:buSzPts val="2400"/>
+              <a:buFont typeface="Roboto"/>
+              <a:buChar char="●"/>
+            </a:pPr>
+            <a:r>
+              <a:rPr lang="en" sz="2400">
+                <a:latin typeface="Roboto"/>
+                <a:ea typeface="Roboto"/>
+                <a:cs typeface="Roboto"/>
+                <a:sym typeface="Roboto"/>
+              </a:rPr>
+              <a:t>building block for domain-services</a:t>
+            </a:r>
+            <a:endParaRPr sz="2400">
+              <a:latin typeface="Roboto"/>
+              <a:ea typeface="Roboto"/>
+              <a:cs typeface="Roboto"/>
+              <a:sym typeface="Roboto"/>
+            </a:endParaRPr>
+          </a:p>
+          <a:p>
+            <a:pPr marL="0" lvl="0" indent="0" algn="l" rtl="0">
+              <a:lnSpc>
+                <a:spcPct val="115000"/>
+              </a:lnSpc>
+              <a:spcBef>
+                <a:spcPts val="1200"/>
+              </a:spcBef>
+              <a:spcAft>
+                <a:spcPts val="1200"/>
+              </a:spcAft>
+              <a:buNone/>
+            </a:pPr>
+            <a:endParaRPr sz="2400">
               <a:latin typeface="Roboto"/>
               <a:ea typeface="Roboto"/>
               <a:cs typeface="Roboto"/>
@@ -15386,6 +15385,96 @@
               <a:sym typeface="Roboto"/>
             </a:endParaRPr>
           </a:p>
+          <a:p>
+            <a:pPr marL="0" lvl="0" indent="0" algn="l" rtl="0">
+              <a:spcBef>
+                <a:spcPts val="0"/>
+              </a:spcBef>
+              <a:spcAft>
+                <a:spcPts val="0"/>
+              </a:spcAft>
+              <a:buNone/>
+            </a:pPr>
+            <a:r>
+              <a:rPr lang="en" sz="2400">
+                <a:latin typeface="Roboto"/>
+                <a:ea typeface="Roboto"/>
+                <a:cs typeface="Roboto"/>
+                <a:sym typeface="Roboto"/>
+              </a:rPr>
+              <a:t>	Concurrent-ruby: </a:t>
+            </a:r>
+            <a:endParaRPr sz="2400">
+              <a:latin typeface="Roboto"/>
+              <a:ea typeface="Roboto"/>
+              <a:cs typeface="Roboto"/>
+              <a:sym typeface="Roboto"/>
+            </a:endParaRPr>
+          </a:p>
+          <a:p>
+            <a:pPr marL="457200" lvl="0" indent="0" algn="l" rtl="0">
+              <a:spcBef>
+                <a:spcPts val="0"/>
+              </a:spcBef>
+              <a:spcAft>
+                <a:spcPts val="0"/>
+              </a:spcAft>
+              <a:buNone/>
+            </a:pPr>
+            <a:r>
+              <a:rPr lang="en" sz="2400" u="sng">
+                <a:solidFill>
+                  <a:schemeClr val="hlink"/>
+                </a:solidFill>
+                <a:latin typeface="Roboto"/>
+                <a:ea typeface="Roboto"/>
+                <a:cs typeface="Roboto"/>
+                <a:sym typeface="Roboto"/>
+                <a:hlinkClick r:id="rId3"/>
+              </a:rPr>
+              <a:t>https://github.com/ruby-concurrency/concurrent-ruby</a:t>
+            </a:r>
+            <a:endParaRPr sz="2400">
+              <a:latin typeface="Roboto"/>
+              <a:ea typeface="Roboto"/>
+              <a:cs typeface="Roboto"/>
+              <a:sym typeface="Roboto"/>
+            </a:endParaRPr>
+          </a:p>
+          <a:p>
+            <a:pPr marL="457200" lvl="0" indent="0" algn="l" rtl="0">
+              <a:spcBef>
+                <a:spcPts val="0"/>
+              </a:spcBef>
+              <a:spcAft>
+                <a:spcPts val="0"/>
+              </a:spcAft>
+              <a:buNone/>
+            </a:pPr>
+            <a:endParaRPr sz="2400">
+              <a:latin typeface="Roboto"/>
+              <a:ea typeface="Roboto"/>
+              <a:cs typeface="Roboto"/>
+              <a:sym typeface="Roboto"/>
+            </a:endParaRPr>
+          </a:p>
+          <a:p>
+            <a:pPr marL="0" lvl="0" indent="0" algn="l" rtl="0">
+              <a:spcBef>
+                <a:spcPts val="0"/>
+              </a:spcBef>
+              <a:spcAft>
+                <a:spcPts val="0"/>
+              </a:spcAft>
+              <a:buNone/>
+            </a:pPr>
+            <a:endParaRPr sz="2400">
+              <a:latin typeface="Roboto"/>
+              <a:ea typeface="Roboto"/>
+              <a:cs typeface="Roboto"/>
+              <a:sym typeface="Roboto"/>
+            </a:endParaRPr>
+          </a:p>
         </p:txBody>
       </p:sp>
     </p:spTree>
@@ -15825,7 +15914,7 @@
                 <a:cs typeface="Roboto"/>
                 <a:sym typeface="Roboto"/>
               </a:rPr>
-              <a:t>For IO-bounded tasks</a:t>
+              <a:t>For IO-bound tasks</a:t>
             </a:r>
             <a:endParaRPr sz="2400">
               <a:latin typeface="Roboto"/>
@@ -15853,7 +15942,7 @@
                 <a:cs typeface="Roboto"/>
                 <a:sym typeface="Roboto"/>
               </a:rPr>
-              <a:t>For CPU-boundend tasks</a:t>
+              <a:t>For CPU-bound tasks</a:t>
             </a:r>
             <a:endParaRPr sz="2400">
               <a:latin typeface="Roboto"/>
@@ -15881,7 +15970,7 @@
                 <a:cs typeface="Roboto"/>
                 <a:sym typeface="Roboto"/>
               </a:rPr>
-              <a:t>Immediate/local</a:t>
+              <a:t>Immediate/local for testing</a:t>
             </a:r>
             <a:endParaRPr sz="2400">
               <a:latin typeface="Roboto"/>

</xml_diff>